<commit_message>
Lean Ux Canvas v2.0
Alteração: coloquei o título na parte de usuário e cliente que estava faltando.
</commit_message>
<xml_diff>
--- a/projeto/Documentos/Lean-Ux-Canvas-Luminous-Editavel.pptx
+++ b/projeto/Documentos/Lean-Ux-Canvas-Luminous-Editavel.pptx
@@ -104,6 +104,11 @@
       </a:defRPr>
     </a:lvl9pPr>
   </p:defaultTextStyle>
+  <p:extLst>
+    <p:ext uri="{EFAFB233-063F-42B5-8137-9DF3F51BA10A}">
+      <p15:sldGuideLst xmlns:p15="http://schemas.microsoft.com/office/powerpoint/2012/main"/>
+    </p:ext>
+  </p:extLst>
 </p:presentation>
 </file>
 
@@ -254,7 +259,7 @@
           <a:p>
             <a:fld id="{BD0250D8-0CD4-4F6A-A80D-10392B57B800}" type="datetimeFigureOut">
               <a:rPr lang="pt-BR" smtClean="0"/>
-              <a:t>11/09/2020</a:t>
+              <a:t>14/09/2020</a:t>
             </a:fld>
             <a:endParaRPr lang="pt-BR"/>
           </a:p>
@@ -452,7 +457,7 @@
           <a:p>
             <a:fld id="{BD0250D8-0CD4-4F6A-A80D-10392B57B800}" type="datetimeFigureOut">
               <a:rPr lang="pt-BR" smtClean="0"/>
-              <a:t>11/09/2020</a:t>
+              <a:t>14/09/2020</a:t>
             </a:fld>
             <a:endParaRPr lang="pt-BR"/>
           </a:p>
@@ -660,7 +665,7 @@
           <a:p>
             <a:fld id="{BD0250D8-0CD4-4F6A-A80D-10392B57B800}" type="datetimeFigureOut">
               <a:rPr lang="pt-BR" smtClean="0"/>
-              <a:t>11/09/2020</a:t>
+              <a:t>14/09/2020</a:t>
             </a:fld>
             <a:endParaRPr lang="pt-BR"/>
           </a:p>
@@ -858,7 +863,7 @@
           <a:p>
             <a:fld id="{BD0250D8-0CD4-4F6A-A80D-10392B57B800}" type="datetimeFigureOut">
               <a:rPr lang="pt-BR" smtClean="0"/>
-              <a:t>11/09/2020</a:t>
+              <a:t>14/09/2020</a:t>
             </a:fld>
             <a:endParaRPr lang="pt-BR"/>
           </a:p>
@@ -1133,7 +1138,7 @@
           <a:p>
             <a:fld id="{BD0250D8-0CD4-4F6A-A80D-10392B57B800}" type="datetimeFigureOut">
               <a:rPr lang="pt-BR" smtClean="0"/>
-              <a:t>11/09/2020</a:t>
+              <a:t>14/09/2020</a:t>
             </a:fld>
             <a:endParaRPr lang="pt-BR"/>
           </a:p>
@@ -1398,7 +1403,7 @@
           <a:p>
             <a:fld id="{BD0250D8-0CD4-4F6A-A80D-10392B57B800}" type="datetimeFigureOut">
               <a:rPr lang="pt-BR" smtClean="0"/>
-              <a:t>11/09/2020</a:t>
+              <a:t>14/09/2020</a:t>
             </a:fld>
             <a:endParaRPr lang="pt-BR"/>
           </a:p>
@@ -1810,7 +1815,7 @@
           <a:p>
             <a:fld id="{BD0250D8-0CD4-4F6A-A80D-10392B57B800}" type="datetimeFigureOut">
               <a:rPr lang="pt-BR" smtClean="0"/>
-              <a:t>11/09/2020</a:t>
+              <a:t>14/09/2020</a:t>
             </a:fld>
             <a:endParaRPr lang="pt-BR"/>
           </a:p>
@@ -1951,7 +1956,7 @@
           <a:p>
             <a:fld id="{BD0250D8-0CD4-4F6A-A80D-10392B57B800}" type="datetimeFigureOut">
               <a:rPr lang="pt-BR" smtClean="0"/>
-              <a:t>11/09/2020</a:t>
+              <a:t>14/09/2020</a:t>
             </a:fld>
             <a:endParaRPr lang="pt-BR"/>
           </a:p>
@@ -2064,7 +2069,7 @@
           <a:p>
             <a:fld id="{BD0250D8-0CD4-4F6A-A80D-10392B57B800}" type="datetimeFigureOut">
               <a:rPr lang="pt-BR" smtClean="0"/>
-              <a:t>11/09/2020</a:t>
+              <a:t>14/09/2020</a:t>
             </a:fld>
             <a:endParaRPr lang="pt-BR"/>
           </a:p>
@@ -2375,7 +2380,7 @@
           <a:p>
             <a:fld id="{BD0250D8-0CD4-4F6A-A80D-10392B57B800}" type="datetimeFigureOut">
               <a:rPr lang="pt-BR" smtClean="0"/>
-              <a:t>11/09/2020</a:t>
+              <a:t>14/09/2020</a:t>
             </a:fld>
             <a:endParaRPr lang="pt-BR"/>
           </a:p>
@@ -2663,7 +2668,7 @@
           <a:p>
             <a:fld id="{BD0250D8-0CD4-4F6A-A80D-10392B57B800}" type="datetimeFigureOut">
               <a:rPr lang="pt-BR" smtClean="0"/>
-              <a:t>11/09/2020</a:t>
+              <a:t>14/09/2020</a:t>
             </a:fld>
             <a:endParaRPr lang="pt-BR"/>
           </a:p>
@@ -2904,7 +2909,7 @@
           <a:p>
             <a:fld id="{BD0250D8-0CD4-4F6A-A80D-10392B57B800}" type="datetimeFigureOut">
               <a:rPr lang="pt-BR" smtClean="0"/>
-              <a:t>11/09/2020</a:t>
+              <a:t>14/09/2020</a:t>
             </a:fld>
             <a:endParaRPr lang="pt-BR"/>
           </a:p>
@@ -4639,6 +4644,44 @@
           </a:p>
         </p:txBody>
       </p:sp>
+      <p:sp>
+        <p:nvSpPr>
+          <p:cNvPr id="29" name="CaixaDeTexto 28">
+            <a:extLst>
+              <a:ext uri="{FF2B5EF4-FFF2-40B4-BE49-F238E27FC236}">
+                <a16:creationId xmlns:a16="http://schemas.microsoft.com/office/drawing/2014/main" id="{162725A7-C7D3-44EF-9F93-76F0B9A59463}"/>
+              </a:ext>
+            </a:extLst>
+          </p:cNvPr>
+          <p:cNvSpPr txBox="1"/>
+          <p:nvPr/>
+        </p:nvSpPr>
+        <p:spPr>
+          <a:xfrm>
+            <a:off x="707921" y="3491141"/>
+            <a:ext cx="2855269" cy="461665"/>
+          </a:xfrm>
+          <a:prstGeom prst="rect">
+            <a:avLst/>
+          </a:prstGeom>
+          <a:noFill/>
+        </p:spPr>
+        <p:txBody>
+          <a:bodyPr wrap="none" rtlCol="0">
+            <a:spAutoFit/>
+          </a:bodyPr>
+          <a:lstStyle/>
+          <a:p>
+            <a:r>
+              <a:rPr lang="pt-BR" sz="2400" dirty="0">
+                <a:latin typeface="MV Boli" panose="02000500030200090000" pitchFamily="2" charset="0"/>
+                <a:cs typeface="MV Boli" panose="02000500030200090000" pitchFamily="2" charset="0"/>
+              </a:rPr>
+              <a:t>Clientes e usuários</a:t>
+            </a:r>
+          </a:p>
+        </p:txBody>
+      </p:sp>
     </p:spTree>
     <p:extLst>
       <p:ext uri="{BB962C8B-B14F-4D97-AF65-F5344CB8AC3E}">

</xml_diff>